<commit_message>
updated flexboxes to include all declarations. updated wireframes with new designs
</commit_message>
<xml_diff>
--- a/documents/component design.pptx
+++ b/documents/component design.pptx
@@ -247,7 +247,7 @@
           <a:p>
             <a:fld id="{08574C21-A8A3-E54E-A163-29D511124F10}" type="datetimeFigureOut">
               <a:rPr lang="en-US" smtClean="0"/>
-              <a:t>9/30/21</a:t>
+              <a:t>10/18/21</a:t>
             </a:fld>
             <a:endParaRPr lang="en-US"/>
           </a:p>
@@ -417,7 +417,7 @@
           <a:p>
             <a:fld id="{08574C21-A8A3-E54E-A163-29D511124F10}" type="datetimeFigureOut">
               <a:rPr lang="en-US" smtClean="0"/>
-              <a:t>9/30/21</a:t>
+              <a:t>10/18/21</a:t>
             </a:fld>
             <a:endParaRPr lang="en-US"/>
           </a:p>
@@ -597,7 +597,7 @@
           <a:p>
             <a:fld id="{08574C21-A8A3-E54E-A163-29D511124F10}" type="datetimeFigureOut">
               <a:rPr lang="en-US" smtClean="0"/>
-              <a:t>9/30/21</a:t>
+              <a:t>10/18/21</a:t>
             </a:fld>
             <a:endParaRPr lang="en-US"/>
           </a:p>
@@ -767,7 +767,7 @@
           <a:p>
             <a:fld id="{08574C21-A8A3-E54E-A163-29D511124F10}" type="datetimeFigureOut">
               <a:rPr lang="en-US" smtClean="0"/>
-              <a:t>9/30/21</a:t>
+              <a:t>10/18/21</a:t>
             </a:fld>
             <a:endParaRPr lang="en-US"/>
           </a:p>
@@ -1011,7 +1011,7 @@
           <a:p>
             <a:fld id="{08574C21-A8A3-E54E-A163-29D511124F10}" type="datetimeFigureOut">
               <a:rPr lang="en-US" smtClean="0"/>
-              <a:t>9/30/21</a:t>
+              <a:t>10/18/21</a:t>
             </a:fld>
             <a:endParaRPr lang="en-US"/>
           </a:p>
@@ -1243,7 +1243,7 @@
           <a:p>
             <a:fld id="{08574C21-A8A3-E54E-A163-29D511124F10}" type="datetimeFigureOut">
               <a:rPr lang="en-US" smtClean="0"/>
-              <a:t>9/30/21</a:t>
+              <a:t>10/18/21</a:t>
             </a:fld>
             <a:endParaRPr lang="en-US"/>
           </a:p>
@@ -1610,7 +1610,7 @@
           <a:p>
             <a:fld id="{08574C21-A8A3-E54E-A163-29D511124F10}" type="datetimeFigureOut">
               <a:rPr lang="en-US" smtClean="0"/>
-              <a:t>9/30/21</a:t>
+              <a:t>10/18/21</a:t>
             </a:fld>
             <a:endParaRPr lang="en-US"/>
           </a:p>
@@ -1728,7 +1728,7 @@
           <a:p>
             <a:fld id="{08574C21-A8A3-E54E-A163-29D511124F10}" type="datetimeFigureOut">
               <a:rPr lang="en-US" smtClean="0"/>
-              <a:t>9/30/21</a:t>
+              <a:t>10/18/21</a:t>
             </a:fld>
             <a:endParaRPr lang="en-US"/>
           </a:p>
@@ -1823,7 +1823,7 @@
           <a:p>
             <a:fld id="{08574C21-A8A3-E54E-A163-29D511124F10}" type="datetimeFigureOut">
               <a:rPr lang="en-US" smtClean="0"/>
-              <a:t>9/30/21</a:t>
+              <a:t>10/18/21</a:t>
             </a:fld>
             <a:endParaRPr lang="en-US"/>
           </a:p>
@@ -2100,7 +2100,7 @@
           <a:p>
             <a:fld id="{08574C21-A8A3-E54E-A163-29D511124F10}" type="datetimeFigureOut">
               <a:rPr lang="en-US" smtClean="0"/>
-              <a:t>9/30/21</a:t>
+              <a:t>10/18/21</a:t>
             </a:fld>
             <a:endParaRPr lang="en-US"/>
           </a:p>
@@ -2357,7 +2357,7 @@
           <a:p>
             <a:fld id="{08574C21-A8A3-E54E-A163-29D511124F10}" type="datetimeFigureOut">
               <a:rPr lang="en-US" smtClean="0"/>
-              <a:t>9/30/21</a:t>
+              <a:t>10/18/21</a:t>
             </a:fld>
             <a:endParaRPr lang="en-US"/>
           </a:p>
@@ -2570,7 +2570,7 @@
           <a:p>
             <a:fld id="{08574C21-A8A3-E54E-A163-29D511124F10}" type="datetimeFigureOut">
               <a:rPr lang="en-US" smtClean="0"/>
-              <a:t>9/30/21</a:t>
+              <a:t>10/18/21</a:t>
             </a:fld>
             <a:endParaRPr lang="en-US"/>
           </a:p>
@@ -4331,7 +4331,7 @@
                   <a:srgbClr val="00B0F0"/>
                 </a:solidFill>
               </a:rPr>
-              <a:t>Tablet, Desktop</a:t>
+              <a:t>Mobile, Tablet, Desktop</a:t>
             </a:r>
           </a:p>
         </p:txBody>
@@ -4567,451 +4567,6 @@
           </a:fontRef>
         </p:style>
       </p:cxnSp>
-      <p:sp>
-        <p:nvSpPr>
-          <p:cNvPr id="32" name="Rectangle 31">
-            <a:extLst>
-              <a:ext uri="{FF2B5EF4-FFF2-40B4-BE49-F238E27FC236}">
-                <a16:creationId xmlns:a16="http://schemas.microsoft.com/office/drawing/2014/main" id="{2CDD4629-54CA-6446-8A6C-C88AC8C5F51C}"/>
-              </a:ext>
-            </a:extLst>
-          </p:cNvPr>
-          <p:cNvSpPr/>
-          <p:nvPr/>
-        </p:nvSpPr>
-        <p:spPr>
-          <a:xfrm>
-            <a:off x="1314669" y="3168953"/>
-            <a:ext cx="2986089" cy="945847"/>
-          </a:xfrm>
-          <a:prstGeom prst="rect">
-            <a:avLst/>
-          </a:prstGeom>
-          <a:solidFill>
-            <a:schemeClr val="bg1"/>
-          </a:solidFill>
-          <a:ln w="19050">
-            <a:solidFill>
-              <a:schemeClr val="tx1"/>
-            </a:solidFill>
-            <a:prstDash val="dash"/>
-          </a:ln>
-        </p:spPr>
-        <p:style>
-          <a:lnRef idx="2">
-            <a:schemeClr val="accent1">
-              <a:shade val="50000"/>
-            </a:schemeClr>
-          </a:lnRef>
-          <a:fillRef idx="1">
-            <a:schemeClr val="accent1"/>
-          </a:fillRef>
-          <a:effectRef idx="0">
-            <a:schemeClr val="accent1"/>
-          </a:effectRef>
-          <a:fontRef idx="minor">
-            <a:schemeClr val="lt1"/>
-          </a:fontRef>
-        </p:style>
-        <p:txBody>
-          <a:bodyPr rtlCol="0" anchor="ctr"/>
-          <a:lstStyle/>
-          <a:p>
-            <a:pPr algn="ctr"/>
-            <a:endParaRPr lang="en-US"/>
-          </a:p>
-        </p:txBody>
-      </p:sp>
-      <p:sp>
-        <p:nvSpPr>
-          <p:cNvPr id="33" name="TextBox 32">
-            <a:extLst>
-              <a:ext uri="{FF2B5EF4-FFF2-40B4-BE49-F238E27FC236}">
-                <a16:creationId xmlns:a16="http://schemas.microsoft.com/office/drawing/2014/main" id="{ADE477E8-1985-214D-A42D-E51D902092AD}"/>
-              </a:ext>
-            </a:extLst>
-          </p:cNvPr>
-          <p:cNvSpPr txBox="1"/>
-          <p:nvPr/>
-        </p:nvSpPr>
-        <p:spPr>
-          <a:xfrm>
-            <a:off x="1371821" y="3327013"/>
-            <a:ext cx="2928937" cy="646331"/>
-          </a:xfrm>
-          <a:prstGeom prst="rect">
-            <a:avLst/>
-          </a:prstGeom>
-          <a:noFill/>
-        </p:spPr>
-        <p:txBody>
-          <a:bodyPr wrap="square" rtlCol="0">
-            <a:spAutoFit/>
-          </a:bodyPr>
-          <a:lstStyle/>
-          <a:p>
-            <a:pPr algn="ctr"/>
-            <a:r>
-              <a:rPr lang="en-US" dirty="0"/>
-              <a:t>First link  &gt;  Second link</a:t>
-            </a:r>
-          </a:p>
-          <a:p>
-            <a:pPr algn="ctr"/>
-            <a:r>
-              <a:rPr lang="en-US" dirty="0"/>
-              <a:t>&gt;  Third link</a:t>
-            </a:r>
-          </a:p>
-        </p:txBody>
-      </p:sp>
-      <p:sp>
-        <p:nvSpPr>
-          <p:cNvPr id="34" name="TextBox 33">
-            <a:extLst>
-              <a:ext uri="{FF2B5EF4-FFF2-40B4-BE49-F238E27FC236}">
-                <a16:creationId xmlns:a16="http://schemas.microsoft.com/office/drawing/2014/main" id="{D3B6961E-28D2-9F4B-807E-2011BB9E3ADA}"/>
-              </a:ext>
-            </a:extLst>
-          </p:cNvPr>
-          <p:cNvSpPr txBox="1"/>
-          <p:nvPr/>
-        </p:nvSpPr>
-        <p:spPr>
-          <a:xfrm>
-            <a:off x="450277" y="4114800"/>
-            <a:ext cx="2386012" cy="307777"/>
-          </a:xfrm>
-          <a:prstGeom prst="rect">
-            <a:avLst/>
-          </a:prstGeom>
-          <a:noFill/>
-        </p:spPr>
-        <p:txBody>
-          <a:bodyPr wrap="square" rtlCol="0">
-            <a:spAutoFit/>
-          </a:bodyPr>
-          <a:lstStyle/>
-          <a:p>
-            <a:pPr algn="ctr"/>
-            <a:r>
-              <a:rPr lang="en-US" sz="1400" dirty="0"/>
-              <a:t>.breadcrumbs-container { }</a:t>
-            </a:r>
-          </a:p>
-        </p:txBody>
-      </p:sp>
-      <p:sp>
-        <p:nvSpPr>
-          <p:cNvPr id="38" name="TextBox 37">
-            <a:extLst>
-              <a:ext uri="{FF2B5EF4-FFF2-40B4-BE49-F238E27FC236}">
-                <a16:creationId xmlns:a16="http://schemas.microsoft.com/office/drawing/2014/main" id="{872353F2-79F3-7845-B2D4-18D01A15BDC3}"/>
-              </a:ext>
-            </a:extLst>
-          </p:cNvPr>
-          <p:cNvSpPr txBox="1"/>
-          <p:nvPr/>
-        </p:nvSpPr>
-        <p:spPr>
-          <a:xfrm>
-            <a:off x="290724" y="2827578"/>
-            <a:ext cx="2386012" cy="307777"/>
-          </a:xfrm>
-          <a:prstGeom prst="rect">
-            <a:avLst/>
-          </a:prstGeom>
-          <a:noFill/>
-        </p:spPr>
-        <p:txBody>
-          <a:bodyPr wrap="square" rtlCol="0">
-            <a:spAutoFit/>
-          </a:bodyPr>
-          <a:lstStyle/>
-          <a:p>
-            <a:pPr algn="ctr"/>
-            <a:r>
-              <a:rPr lang="en-US" sz="1400" dirty="0"/>
-              <a:t>.breadcrumbs-first { }</a:t>
-            </a:r>
-          </a:p>
-        </p:txBody>
-      </p:sp>
-      <p:sp>
-        <p:nvSpPr>
-          <p:cNvPr id="39" name="TextBox 38">
-            <a:extLst>
-              <a:ext uri="{FF2B5EF4-FFF2-40B4-BE49-F238E27FC236}">
-                <a16:creationId xmlns:a16="http://schemas.microsoft.com/office/drawing/2014/main" id="{52B0D500-4451-BE47-BEB8-D70503657390}"/>
-              </a:ext>
-            </a:extLst>
-          </p:cNvPr>
-          <p:cNvSpPr txBox="1"/>
-          <p:nvPr/>
-        </p:nvSpPr>
-        <p:spPr>
-          <a:xfrm>
-            <a:off x="2538633" y="2810629"/>
-            <a:ext cx="2386012" cy="307777"/>
-          </a:xfrm>
-          <a:prstGeom prst="rect">
-            <a:avLst/>
-          </a:prstGeom>
-          <a:noFill/>
-        </p:spPr>
-        <p:txBody>
-          <a:bodyPr wrap="square" rtlCol="0">
-            <a:spAutoFit/>
-          </a:bodyPr>
-          <a:lstStyle/>
-          <a:p>
-            <a:pPr algn="ctr"/>
-            <a:r>
-              <a:rPr lang="en-US" sz="1400" dirty="0"/>
-              <a:t>.breadcrumbs-second { }</a:t>
-            </a:r>
-          </a:p>
-        </p:txBody>
-      </p:sp>
-      <p:sp>
-        <p:nvSpPr>
-          <p:cNvPr id="40" name="TextBox 39">
-            <a:extLst>
-              <a:ext uri="{FF2B5EF4-FFF2-40B4-BE49-F238E27FC236}">
-                <a16:creationId xmlns:a16="http://schemas.microsoft.com/office/drawing/2014/main" id="{45C3951B-1A45-3244-9179-ABE961A28DDA}"/>
-              </a:ext>
-            </a:extLst>
-          </p:cNvPr>
-          <p:cNvSpPr txBox="1"/>
-          <p:nvPr/>
-        </p:nvSpPr>
-        <p:spPr>
-          <a:xfrm>
-            <a:off x="2538633" y="4114800"/>
-            <a:ext cx="2386012" cy="307777"/>
-          </a:xfrm>
-          <a:prstGeom prst="rect">
-            <a:avLst/>
-          </a:prstGeom>
-          <a:noFill/>
-        </p:spPr>
-        <p:txBody>
-          <a:bodyPr wrap="square" rtlCol="0">
-            <a:spAutoFit/>
-          </a:bodyPr>
-          <a:lstStyle/>
-          <a:p>
-            <a:pPr algn="ctr"/>
-            <a:r>
-              <a:rPr lang="en-US" sz="1400" dirty="0"/>
-              <a:t>.breadcrumbs-third { }</a:t>
-            </a:r>
-          </a:p>
-        </p:txBody>
-      </p:sp>
-      <p:cxnSp>
-        <p:nvCxnSpPr>
-          <p:cNvPr id="41" name="Straight Connector 40">
-            <a:extLst>
-              <a:ext uri="{FF2B5EF4-FFF2-40B4-BE49-F238E27FC236}">
-                <a16:creationId xmlns:a16="http://schemas.microsoft.com/office/drawing/2014/main" id="{A5442560-7254-8146-8C7C-AE3A854DA07A}"/>
-              </a:ext>
-            </a:extLst>
-          </p:cNvPr>
-          <p:cNvCxnSpPr/>
-          <p:nvPr/>
-        </p:nvCxnSpPr>
-        <p:spPr>
-          <a:xfrm>
-            <a:off x="1920993" y="3074510"/>
-            <a:ext cx="0" cy="252503"/>
-          </a:xfrm>
-          <a:prstGeom prst="line">
-            <a:avLst/>
-          </a:prstGeom>
-          <a:ln>
-            <a:solidFill>
-              <a:schemeClr val="tx1"/>
-            </a:solidFill>
-          </a:ln>
-        </p:spPr>
-        <p:style>
-          <a:lnRef idx="1">
-            <a:schemeClr val="accent1"/>
-          </a:lnRef>
-          <a:fillRef idx="0">
-            <a:schemeClr val="accent1"/>
-          </a:fillRef>
-          <a:effectRef idx="0">
-            <a:schemeClr val="accent1"/>
-          </a:effectRef>
-          <a:fontRef idx="minor">
-            <a:schemeClr val="tx1"/>
-          </a:fontRef>
-        </p:style>
-      </p:cxnSp>
-      <p:cxnSp>
-        <p:nvCxnSpPr>
-          <p:cNvPr id="44" name="Straight Connector 43">
-            <a:extLst>
-              <a:ext uri="{FF2B5EF4-FFF2-40B4-BE49-F238E27FC236}">
-                <a16:creationId xmlns:a16="http://schemas.microsoft.com/office/drawing/2014/main" id="{0E797CDA-FC5A-134C-95AC-C31B81C5262C}"/>
-              </a:ext>
-            </a:extLst>
-          </p:cNvPr>
-          <p:cNvCxnSpPr/>
-          <p:nvPr/>
-        </p:nvCxnSpPr>
-        <p:spPr>
-          <a:xfrm>
-            <a:off x="3430709" y="3069742"/>
-            <a:ext cx="0" cy="252503"/>
-          </a:xfrm>
-          <a:prstGeom prst="line">
-            <a:avLst/>
-          </a:prstGeom>
-          <a:ln>
-            <a:solidFill>
-              <a:schemeClr val="tx1"/>
-            </a:solidFill>
-          </a:ln>
-        </p:spPr>
-        <p:style>
-          <a:lnRef idx="1">
-            <a:schemeClr val="accent1"/>
-          </a:lnRef>
-          <a:fillRef idx="0">
-            <a:schemeClr val="accent1"/>
-          </a:fillRef>
-          <a:effectRef idx="0">
-            <a:schemeClr val="accent1"/>
-          </a:effectRef>
-          <a:fontRef idx="minor">
-            <a:schemeClr val="tx1"/>
-          </a:fontRef>
-        </p:style>
-      </p:cxnSp>
-      <p:cxnSp>
-        <p:nvCxnSpPr>
-          <p:cNvPr id="45" name="Straight Connector 44">
-            <a:extLst>
-              <a:ext uri="{FF2B5EF4-FFF2-40B4-BE49-F238E27FC236}">
-                <a16:creationId xmlns:a16="http://schemas.microsoft.com/office/drawing/2014/main" id="{9BC5F283-6EE1-3F41-A4E4-A1D8D4D925EB}"/>
-              </a:ext>
-            </a:extLst>
-          </p:cNvPr>
-          <p:cNvCxnSpPr/>
-          <p:nvPr/>
-        </p:nvCxnSpPr>
-        <p:spPr>
-          <a:xfrm>
-            <a:off x="1916226" y="3941295"/>
-            <a:ext cx="0" cy="252503"/>
-          </a:xfrm>
-          <a:prstGeom prst="line">
-            <a:avLst/>
-          </a:prstGeom>
-          <a:ln>
-            <a:solidFill>
-              <a:schemeClr val="tx1"/>
-            </a:solidFill>
-          </a:ln>
-        </p:spPr>
-        <p:style>
-          <a:lnRef idx="1">
-            <a:schemeClr val="accent1"/>
-          </a:lnRef>
-          <a:fillRef idx="0">
-            <a:schemeClr val="accent1"/>
-          </a:fillRef>
-          <a:effectRef idx="0">
-            <a:schemeClr val="accent1"/>
-          </a:effectRef>
-          <a:fontRef idx="minor">
-            <a:schemeClr val="tx1"/>
-          </a:fontRef>
-        </p:style>
-      </p:cxnSp>
-      <p:cxnSp>
-        <p:nvCxnSpPr>
-          <p:cNvPr id="46" name="Straight Connector 45">
-            <a:extLst>
-              <a:ext uri="{FF2B5EF4-FFF2-40B4-BE49-F238E27FC236}">
-                <a16:creationId xmlns:a16="http://schemas.microsoft.com/office/drawing/2014/main" id="{9B5C4507-A3D1-8941-B598-77299DEFA86F}"/>
-              </a:ext>
-            </a:extLst>
-          </p:cNvPr>
-          <p:cNvCxnSpPr/>
-          <p:nvPr/>
-        </p:nvCxnSpPr>
-        <p:spPr>
-          <a:xfrm>
-            <a:off x="3159251" y="3941292"/>
-            <a:ext cx="0" cy="252503"/>
-          </a:xfrm>
-          <a:prstGeom prst="line">
-            <a:avLst/>
-          </a:prstGeom>
-          <a:ln>
-            <a:solidFill>
-              <a:schemeClr val="tx1"/>
-            </a:solidFill>
-          </a:ln>
-        </p:spPr>
-        <p:style>
-          <a:lnRef idx="1">
-            <a:schemeClr val="accent1"/>
-          </a:lnRef>
-          <a:fillRef idx="0">
-            <a:schemeClr val="accent1"/>
-          </a:fillRef>
-          <a:effectRef idx="0">
-            <a:schemeClr val="accent1"/>
-          </a:effectRef>
-          <a:fontRef idx="minor">
-            <a:schemeClr val="tx1"/>
-          </a:fontRef>
-        </p:style>
-      </p:cxnSp>
-      <p:sp>
-        <p:nvSpPr>
-          <p:cNvPr id="47" name="TextBox 46">
-            <a:extLst>
-              <a:ext uri="{FF2B5EF4-FFF2-40B4-BE49-F238E27FC236}">
-                <a16:creationId xmlns:a16="http://schemas.microsoft.com/office/drawing/2014/main" id="{35B68B50-C238-B248-98BE-6005018A4BFA}"/>
-              </a:ext>
-            </a:extLst>
-          </p:cNvPr>
-          <p:cNvSpPr txBox="1"/>
-          <p:nvPr/>
-        </p:nvSpPr>
-        <p:spPr>
-          <a:xfrm>
-            <a:off x="658706" y="2508039"/>
-            <a:ext cx="4391023" cy="338554"/>
-          </a:xfrm>
-          <a:prstGeom prst="rect">
-            <a:avLst/>
-          </a:prstGeom>
-          <a:noFill/>
-        </p:spPr>
-        <p:txBody>
-          <a:bodyPr wrap="square" rtlCol="0">
-            <a:spAutoFit/>
-          </a:bodyPr>
-          <a:lstStyle/>
-          <a:p>
-            <a:r>
-              <a:rPr lang="en-US" sz="1600" b="1" dirty="0">
-                <a:solidFill>
-                  <a:srgbClr val="00B0F0"/>
-                </a:solidFill>
-              </a:rPr>
-              <a:t>Mobile</a:t>
-            </a:r>
-          </a:p>
-        </p:txBody>
-      </p:sp>
       <p:sp>
         <p:nvSpPr>
           <p:cNvPr id="48" name="Rectangle 47">
@@ -6329,7 +5884,7 @@
                   <a:srgbClr val="00B0F0"/>
                 </a:solidFill>
               </a:rPr>
-              <a:t>Tablet, Desktop (Mobile on next slide)</a:t>
+              <a:t>Desktop (Mobile and Tablet on next slide)</a:t>
             </a:r>
           </a:p>
         </p:txBody>
@@ -7163,7 +6718,7 @@
           <a:p>
             <a:r>
               <a:rPr lang="en-US" sz="1400" dirty="0"/>
-              <a:t>/* PRODUCT CARD COMPONENT */</a:t>
+              <a:t>/* FEATURE COMPONENT */</a:t>
             </a:r>
           </a:p>
         </p:txBody>
@@ -7501,7 +7056,7 @@
                   <a:srgbClr val="00B0F0"/>
                 </a:solidFill>
               </a:rPr>
-              <a:t>Mobile</a:t>
+              <a:t>Mobile, Tablet</a:t>
             </a:r>
           </a:p>
         </p:txBody>
@@ -8337,7 +7892,7 @@
           <a:p>
             <a:r>
               <a:rPr lang="en-US" sz="1400" dirty="0"/>
-              <a:t>/* PRODUCT CARD COMPONENT */</a:t>
+              <a:t>/* FEATURE COMPONENT */</a:t>
             </a:r>
           </a:p>
         </p:txBody>

</xml_diff>